<commit_message>
update slides for tuesday and wednesday
</commit_message>
<xml_diff>
--- a/week 1/2 - Tuesday/Intro-modelling-and-metapopulation-dynamics.pptx
+++ b/week 1/2 - Tuesday/Intro-modelling-and-metapopulation-dynamics.pptx
@@ -243,7 +243,7 @@
           <a:p>
             <a:fld id="{F3DE219B-F4DD-734B-A456-3760926EB4C9}" type="datetimeFigureOut">
               <a:rPr lang="en-GB" smtClean="0"/>
-              <a:t>09/01/2023</a:t>
+              <a:t>04/01/2024</a:t>
             </a:fld>
             <a:endParaRPr lang="en-GB"/>
           </a:p>
@@ -487,7 +487,7 @@
           <a:p>
             <a:fld id="{7AD32FB1-5A1F-D34B-A3DB-2C96BF86D95A}" type="datetimeFigureOut">
               <a:rPr lang="en-AU" smtClean="0"/>
-              <a:t>9/1/2023</a:t>
+              <a:t>4/1/2024</a:t>
             </a:fld>
             <a:endParaRPr lang="en-AU"/>
           </a:p>
@@ -687,7 +687,7 @@
           <a:p>
             <a:fld id="{7AD32FB1-5A1F-D34B-A3DB-2C96BF86D95A}" type="datetimeFigureOut">
               <a:rPr lang="en-AU" smtClean="0"/>
-              <a:t>9/1/2023</a:t>
+              <a:t>4/1/2024</a:t>
             </a:fld>
             <a:endParaRPr lang="en-AU"/>
           </a:p>
@@ -897,7 +897,7 @@
           <a:p>
             <a:fld id="{7AD32FB1-5A1F-D34B-A3DB-2C96BF86D95A}" type="datetimeFigureOut">
               <a:rPr lang="en-AU" smtClean="0"/>
-              <a:t>9/1/2023</a:t>
+              <a:t>4/1/2024</a:t>
             </a:fld>
             <a:endParaRPr lang="en-AU"/>
           </a:p>
@@ -1097,7 +1097,7 @@
           <a:p>
             <a:fld id="{7AD32FB1-5A1F-D34B-A3DB-2C96BF86D95A}" type="datetimeFigureOut">
               <a:rPr lang="en-AU" smtClean="0"/>
-              <a:t>9/1/2023</a:t>
+              <a:t>4/1/2024</a:t>
             </a:fld>
             <a:endParaRPr lang="en-AU"/>
           </a:p>
@@ -1373,7 +1373,7 @@
           <a:p>
             <a:fld id="{7AD32FB1-5A1F-D34B-A3DB-2C96BF86D95A}" type="datetimeFigureOut">
               <a:rPr lang="en-AU" smtClean="0"/>
-              <a:t>9/1/2023</a:t>
+              <a:t>4/1/2024</a:t>
             </a:fld>
             <a:endParaRPr lang="en-AU"/>
           </a:p>
@@ -1641,7 +1641,7 @@
           <a:p>
             <a:fld id="{7AD32FB1-5A1F-D34B-A3DB-2C96BF86D95A}" type="datetimeFigureOut">
               <a:rPr lang="en-AU" smtClean="0"/>
-              <a:t>9/1/2023</a:t>
+              <a:t>4/1/2024</a:t>
             </a:fld>
             <a:endParaRPr lang="en-AU"/>
           </a:p>
@@ -2056,7 +2056,7 @@
           <a:p>
             <a:fld id="{7AD32FB1-5A1F-D34B-A3DB-2C96BF86D95A}" type="datetimeFigureOut">
               <a:rPr lang="en-AU" smtClean="0"/>
-              <a:t>9/1/2023</a:t>
+              <a:t>4/1/2024</a:t>
             </a:fld>
             <a:endParaRPr lang="en-AU"/>
           </a:p>
@@ -2198,7 +2198,7 @@
           <a:p>
             <a:fld id="{7AD32FB1-5A1F-D34B-A3DB-2C96BF86D95A}" type="datetimeFigureOut">
               <a:rPr lang="en-AU" smtClean="0"/>
-              <a:t>9/1/2023</a:t>
+              <a:t>4/1/2024</a:t>
             </a:fld>
             <a:endParaRPr lang="en-AU"/>
           </a:p>
@@ -2311,7 +2311,7 @@
           <a:p>
             <a:fld id="{7AD32FB1-5A1F-D34B-A3DB-2C96BF86D95A}" type="datetimeFigureOut">
               <a:rPr lang="en-AU" smtClean="0"/>
-              <a:t>9/1/2023</a:t>
+              <a:t>4/1/2024</a:t>
             </a:fld>
             <a:endParaRPr lang="en-AU"/>
           </a:p>
@@ -2624,7 +2624,7 @@
           <a:p>
             <a:fld id="{7AD32FB1-5A1F-D34B-A3DB-2C96BF86D95A}" type="datetimeFigureOut">
               <a:rPr lang="en-AU" smtClean="0"/>
-              <a:t>9/1/2023</a:t>
+              <a:t>4/1/2024</a:t>
             </a:fld>
             <a:endParaRPr lang="en-AU"/>
           </a:p>
@@ -2913,7 +2913,7 @@
           <a:p>
             <a:fld id="{7AD32FB1-5A1F-D34B-A3DB-2C96BF86D95A}" type="datetimeFigureOut">
               <a:rPr lang="en-AU" smtClean="0"/>
-              <a:t>9/1/2023</a:t>
+              <a:t>4/1/2024</a:t>
             </a:fld>
             <a:endParaRPr lang="en-AU"/>
           </a:p>
@@ -3156,7 +3156,7 @@
           <a:p>
             <a:fld id="{7AD32FB1-5A1F-D34B-A3DB-2C96BF86D95A}" type="datetimeFigureOut">
               <a:rPr lang="en-AU" smtClean="0"/>
-              <a:t>9/1/2023</a:t>
+              <a:t>4/1/2024</a:t>
             </a:fld>
             <a:endParaRPr lang="en-AU"/>
           </a:p>
@@ -5310,6 +5310,50 @@
           </a:prstGeom>
         </p:spPr>
       </p:pic>
+      <p:sp>
+        <p:nvSpPr>
+          <p:cNvPr id="7" name="TextBox 6">
+            <a:extLst>
+              <a:ext uri="{FF2B5EF4-FFF2-40B4-BE49-F238E27FC236}">
+                <a16:creationId xmlns:a16="http://schemas.microsoft.com/office/drawing/2014/main" id="{F871FC1B-E9E2-B552-C0B8-B5D16FF00E90}"/>
+              </a:ext>
+            </a:extLst>
+          </p:cNvPr>
+          <p:cNvSpPr txBox="1"/>
+          <p:nvPr/>
+        </p:nvSpPr>
+        <p:spPr>
+          <a:xfrm>
+            <a:off x="10041603" y="6482993"/>
+            <a:ext cx="2150397" cy="369332"/>
+          </a:xfrm>
+          <a:prstGeom prst="rect">
+            <a:avLst/>
+          </a:prstGeom>
+          <a:noFill/>
+        </p:spPr>
+        <p:txBody>
+          <a:bodyPr wrap="none" rtlCol="0">
+            <a:spAutoFit/>
+          </a:bodyPr>
+          <a:lstStyle/>
+          <a:p>
+            <a:r>
+              <a:rPr lang="en-GB" dirty="0" err="1"/>
+              <a:t>Levins</a:t>
+            </a:r>
+            <a:r>
+              <a:rPr lang="en-GB" dirty="0"/>
+              <a:t> 1966</a:t>
+            </a:r>
+            <a:r>
+              <a:rPr lang="en-GB" i="1" dirty="0"/>
+              <a:t> Amer Sci</a:t>
+            </a:r>
+            <a:endParaRPr lang="en-GB" dirty="0"/>
+          </a:p>
+        </p:txBody>
+      </p:sp>
     </p:spTree>
     <p:extLst>
       <p:ext uri="{BB962C8B-B14F-4D97-AF65-F5344CB8AC3E}">

</xml_diff>